<commit_message>
Los cambios realizados fueron: * Cambie el nombre del pdf que tengo que entregar. * Unifiqué el nombre de la barra/alambre a finalmente   solo alambre. * Completé todas las figuras faltantes. * Agrué una introducción explicando las leyes de   Newton y la fuerza elástica. * Corregí algunos errores en la escritura. * Corregí problemas con las inserciones de figuras   sobre el multicols de latex. * Agregué el análitico que envié para poder tener   alguna referencia el año que viene.
En principio ya debería estar todo terminado, si
no encuentro mayores errores este va a ser el
último commit de esta carpeta "2025".
</commit_message>
<xml_diff>
--- a/2025/src/gráfico del vínculo.pptx
+++ b/2025/src/gráfico del vínculo.pptx
@@ -104,6 +104,11 @@
       </a:defRPr>
     </a:lvl9pPr>
   </p:defaultTextStyle>
+  <p:extLst>
+    <p:ext uri="{EFAFB233-063F-42B5-8137-9DF3F51BA10A}">
+      <p15:sldGuideLst xmlns:p15="http://schemas.microsoft.com/office/powerpoint/2012/main"/>
+    </p:ext>
+  </p:extLst>
 </p:presentation>
 </file>
 
@@ -238,7 +243,7 @@
           <a:p>
             <a:fld id="{BF50C222-A348-49FA-A5CE-3C9915B914D9}" type="datetimeFigureOut">
               <a:rPr lang="en-US" smtClean="0"/>
-              <a:t>9/28/2025</a:t>
+              <a:t>9/29/2025</a:t>
             </a:fld>
             <a:endParaRPr lang="en-US"/>
           </a:p>
@@ -408,7 +413,7 @@
           <a:p>
             <a:fld id="{BF50C222-A348-49FA-A5CE-3C9915B914D9}" type="datetimeFigureOut">
               <a:rPr lang="en-US" smtClean="0"/>
-              <a:t>9/28/2025</a:t>
+              <a:t>9/29/2025</a:t>
             </a:fld>
             <a:endParaRPr lang="en-US"/>
           </a:p>
@@ -588,7 +593,7 @@
           <a:p>
             <a:fld id="{BF50C222-A348-49FA-A5CE-3C9915B914D9}" type="datetimeFigureOut">
               <a:rPr lang="en-US" smtClean="0"/>
-              <a:t>9/28/2025</a:t>
+              <a:t>9/29/2025</a:t>
             </a:fld>
             <a:endParaRPr lang="en-US"/>
           </a:p>
@@ -758,7 +763,7 @@
           <a:p>
             <a:fld id="{BF50C222-A348-49FA-A5CE-3C9915B914D9}" type="datetimeFigureOut">
               <a:rPr lang="en-US" smtClean="0"/>
-              <a:t>9/28/2025</a:t>
+              <a:t>9/29/2025</a:t>
             </a:fld>
             <a:endParaRPr lang="en-US"/>
           </a:p>
@@ -1002,7 +1007,7 @@
           <a:p>
             <a:fld id="{BF50C222-A348-49FA-A5CE-3C9915B914D9}" type="datetimeFigureOut">
               <a:rPr lang="en-US" smtClean="0"/>
-              <a:t>9/28/2025</a:t>
+              <a:t>9/29/2025</a:t>
             </a:fld>
             <a:endParaRPr lang="en-US"/>
           </a:p>
@@ -1234,7 +1239,7 @@
           <a:p>
             <a:fld id="{BF50C222-A348-49FA-A5CE-3C9915B914D9}" type="datetimeFigureOut">
               <a:rPr lang="en-US" smtClean="0"/>
-              <a:t>9/28/2025</a:t>
+              <a:t>9/29/2025</a:t>
             </a:fld>
             <a:endParaRPr lang="en-US"/>
           </a:p>
@@ -1601,7 +1606,7 @@
           <a:p>
             <a:fld id="{BF50C222-A348-49FA-A5CE-3C9915B914D9}" type="datetimeFigureOut">
               <a:rPr lang="en-US" smtClean="0"/>
-              <a:t>9/28/2025</a:t>
+              <a:t>9/29/2025</a:t>
             </a:fld>
             <a:endParaRPr lang="en-US"/>
           </a:p>
@@ -1719,7 +1724,7 @@
           <a:p>
             <a:fld id="{BF50C222-A348-49FA-A5CE-3C9915B914D9}" type="datetimeFigureOut">
               <a:rPr lang="en-US" smtClean="0"/>
-              <a:t>9/28/2025</a:t>
+              <a:t>9/29/2025</a:t>
             </a:fld>
             <a:endParaRPr lang="en-US"/>
           </a:p>
@@ -1814,7 +1819,7 @@
           <a:p>
             <a:fld id="{BF50C222-A348-49FA-A5CE-3C9915B914D9}" type="datetimeFigureOut">
               <a:rPr lang="en-US" smtClean="0"/>
-              <a:t>9/28/2025</a:t>
+              <a:t>9/29/2025</a:t>
             </a:fld>
             <a:endParaRPr lang="en-US"/>
           </a:p>
@@ -2091,7 +2096,7 @@
           <a:p>
             <a:fld id="{BF50C222-A348-49FA-A5CE-3C9915B914D9}" type="datetimeFigureOut">
               <a:rPr lang="en-US" smtClean="0"/>
-              <a:t>9/28/2025</a:t>
+              <a:t>9/29/2025</a:t>
             </a:fld>
             <a:endParaRPr lang="en-US"/>
           </a:p>
@@ -2348,7 +2353,7 @@
           <a:p>
             <a:fld id="{BF50C222-A348-49FA-A5CE-3C9915B914D9}" type="datetimeFigureOut">
               <a:rPr lang="en-US" smtClean="0"/>
-              <a:t>9/28/2025</a:t>
+              <a:t>9/29/2025</a:t>
             </a:fld>
             <a:endParaRPr lang="en-US"/>
           </a:p>
@@ -2561,7 +2566,7 @@
           <a:p>
             <a:fld id="{BF50C222-A348-49FA-A5CE-3C9915B914D9}" type="datetimeFigureOut">
               <a:rPr lang="en-US" smtClean="0"/>
-              <a:t>9/28/2025</a:t>
+              <a:t>9/29/2025</a:t>
             </a:fld>
             <a:endParaRPr lang="en-US"/>
           </a:p>
@@ -3276,8 +3281,8 @@
         </p:nvSpPr>
         <p:spPr>
           <a:xfrm rot="2630356">
-            <a:off x="1077673" y="1437040"/>
-            <a:ext cx="811441" cy="400110"/>
+            <a:off x="938117" y="1437040"/>
+            <a:ext cx="1090555" cy="400110"/>
           </a:xfrm>
           <a:prstGeom prst="rect">
             <a:avLst/>
@@ -3291,14 +3296,14 @@
           <a:lstStyle/>
           <a:p>
             <a:r>
-              <a:rPr lang="es-AR" sz="2000" b="1" dirty="0">
+              <a:rPr lang="es-AR" sz="2000" b="1" dirty="0" smtClean="0">
                 <a:solidFill>
                   <a:srgbClr val="843C0C"/>
                 </a:solidFill>
                 <a:latin typeface="Times New Roman" panose="02020603050405020304" pitchFamily="18" charset="0"/>
                 <a:cs typeface="Times New Roman" panose="02020603050405020304" pitchFamily="18" charset="0"/>
               </a:rPr>
-              <a:t>barra</a:t>
+              <a:t>alambre</a:t>
             </a:r>
             <a:endParaRPr lang="en-US" sz="2000" b="1" dirty="0">
               <a:solidFill>
@@ -3359,8 +3364,8 @@
           </a:p>
         </p:txBody>
       </p:sp>
-      <mc:AlternateContent xmlns:mc="http://schemas.openxmlformats.org/markup-compatibility/2006">
-        <mc:Choice xmlns:a14="http://schemas.microsoft.com/office/drawing/2010/main" Requires="a14">
+      <mc:AlternateContent xmlns:mc="http://schemas.openxmlformats.org/markup-compatibility/2006" xmlns:a14="http://schemas.microsoft.com/office/drawing/2010/main">
+        <mc:Choice Requires="a14">
           <p:sp>
             <p:nvSpPr>
               <p:cNvPr id="32" name="CuadroTexto 31"/>
@@ -3383,6 +3388,7 @@
               </a:bodyPr>
               <a:lstStyle/>
               <a:p>
+                <a:pPr/>
                 <a14:m>
                   <m:oMathPara xmlns:m="http://schemas.openxmlformats.org/officeDocument/2006/math">
                     <m:oMathParaPr>
@@ -3411,7 +3417,7 @@
             </p:txBody>
           </p:sp>
         </mc:Choice>
-        <mc:Fallback>
+        <mc:Fallback xmlns="">
           <p:sp>
             <p:nvSpPr>
               <p:cNvPr id="32" name="CuadroTexto 31"/>

</xml_diff>